<commit_message>
Added some models and quaternion stuff
</commit_message>
<xml_diff>
--- a/6044_FramPat/D2D/W05/Behaviour Patterns 1.pptx
+++ b/6044_FramPat/D2D/W05/Behaviour Patterns 1.pptx
@@ -9,9 +9,6 @@
     <p:sldId id="259" r:id="rId3"/>
     <p:sldId id="260" r:id="rId4"/>
     <p:sldId id="261" r:id="rId5"/>
-    <p:sldId id="263" r:id="rId6"/>
-    <p:sldId id="262" r:id="rId7"/>
-    <p:sldId id="264" r:id="rId8"/>
   </p:sldIdLst>
   <p:sldSz cx="12192000" cy="6858000"/>
   <p:notesSz cx="6858000" cy="9144000"/>
@@ -267,7 +264,7 @@
           <a:p>
             <a:fld id="{6C71860C-01FE-4F98-8734-54F4F59C8235}" type="datetimeFigureOut">
               <a:rPr lang="en-CA" smtClean="0"/>
-              <a:t>2023-10-02</a:t>
+              <a:t>2023-10-12</a:t>
             </a:fld>
             <a:endParaRPr lang="en-CA"/>
           </a:p>
@@ -467,7 +464,7 @@
           <a:p>
             <a:fld id="{6C71860C-01FE-4F98-8734-54F4F59C8235}" type="datetimeFigureOut">
               <a:rPr lang="en-CA" smtClean="0"/>
-              <a:t>2023-10-02</a:t>
+              <a:t>2023-10-12</a:t>
             </a:fld>
             <a:endParaRPr lang="en-CA"/>
           </a:p>
@@ -677,7 +674,7 @@
           <a:p>
             <a:fld id="{6C71860C-01FE-4F98-8734-54F4F59C8235}" type="datetimeFigureOut">
               <a:rPr lang="en-CA" smtClean="0"/>
-              <a:t>2023-10-02</a:t>
+              <a:t>2023-10-12</a:t>
             </a:fld>
             <a:endParaRPr lang="en-CA"/>
           </a:p>
@@ -877,7 +874,7 @@
           <a:p>
             <a:fld id="{6C71860C-01FE-4F98-8734-54F4F59C8235}" type="datetimeFigureOut">
               <a:rPr lang="en-CA" smtClean="0"/>
-              <a:t>2023-10-02</a:t>
+              <a:t>2023-10-12</a:t>
             </a:fld>
             <a:endParaRPr lang="en-CA"/>
           </a:p>
@@ -1153,7 +1150,7 @@
           <a:p>
             <a:fld id="{6C71860C-01FE-4F98-8734-54F4F59C8235}" type="datetimeFigureOut">
               <a:rPr lang="en-CA" smtClean="0"/>
-              <a:t>2023-10-02</a:t>
+              <a:t>2023-10-12</a:t>
             </a:fld>
             <a:endParaRPr lang="en-CA"/>
           </a:p>
@@ -1421,7 +1418,7 @@
           <a:p>
             <a:fld id="{6C71860C-01FE-4F98-8734-54F4F59C8235}" type="datetimeFigureOut">
               <a:rPr lang="en-CA" smtClean="0"/>
-              <a:t>2023-10-02</a:t>
+              <a:t>2023-10-12</a:t>
             </a:fld>
             <a:endParaRPr lang="en-CA"/>
           </a:p>
@@ -1836,7 +1833,7 @@
           <a:p>
             <a:fld id="{6C71860C-01FE-4F98-8734-54F4F59C8235}" type="datetimeFigureOut">
               <a:rPr lang="en-CA" smtClean="0"/>
-              <a:t>2023-10-02</a:t>
+              <a:t>2023-10-12</a:t>
             </a:fld>
             <a:endParaRPr lang="en-CA"/>
           </a:p>
@@ -1978,7 +1975,7 @@
           <a:p>
             <a:fld id="{6C71860C-01FE-4F98-8734-54F4F59C8235}" type="datetimeFigureOut">
               <a:rPr lang="en-CA" smtClean="0"/>
-              <a:t>2023-10-02</a:t>
+              <a:t>2023-10-12</a:t>
             </a:fld>
             <a:endParaRPr lang="en-CA"/>
           </a:p>
@@ -2091,7 +2088,7 @@
           <a:p>
             <a:fld id="{6C71860C-01FE-4F98-8734-54F4F59C8235}" type="datetimeFigureOut">
               <a:rPr lang="en-CA" smtClean="0"/>
-              <a:t>2023-10-02</a:t>
+              <a:t>2023-10-12</a:t>
             </a:fld>
             <a:endParaRPr lang="en-CA"/>
           </a:p>
@@ -2404,7 +2401,7 @@
           <a:p>
             <a:fld id="{6C71860C-01FE-4F98-8734-54F4F59C8235}" type="datetimeFigureOut">
               <a:rPr lang="en-CA" smtClean="0"/>
-              <a:t>2023-10-02</a:t>
+              <a:t>2023-10-12</a:t>
             </a:fld>
             <a:endParaRPr lang="en-CA"/>
           </a:p>
@@ -2693,7 +2690,7 @@
           <a:p>
             <a:fld id="{6C71860C-01FE-4F98-8734-54F4F59C8235}" type="datetimeFigureOut">
               <a:rPr lang="en-CA" smtClean="0"/>
-              <a:t>2023-10-02</a:t>
+              <a:t>2023-10-12</a:t>
             </a:fld>
             <a:endParaRPr lang="en-CA"/>
           </a:p>
@@ -2936,7 +2933,7 @@
           <a:p>
             <a:fld id="{6C71860C-01FE-4F98-8734-54F4F59C8235}" type="datetimeFigureOut">
               <a:rPr lang="en-CA" smtClean="0"/>
-              <a:t>2023-10-02</a:t>
+              <a:t>2023-10-12</a:t>
             </a:fld>
             <a:endParaRPr lang="en-CA"/>
           </a:p>
@@ -3376,7 +3373,7 @@
           <a:p>
             <a:r>
               <a:rPr lang="en-CA" dirty="0"/>
-              <a:t>Factory Patterns:</a:t>
+              <a:t>Behaviour patterns:</a:t>
             </a:r>
           </a:p>
         </p:txBody>
@@ -3404,25 +3401,13 @@
           <a:p>
             <a:r>
               <a:rPr lang="en-CA" dirty="0"/>
-              <a:t>Abstract Factory</a:t>
+              <a:t>Friend</a:t>
             </a:r>
           </a:p>
           <a:p>
             <a:r>
               <a:rPr lang="en-CA" dirty="0"/>
-              <a:t>Singleton</a:t>
-            </a:r>
-          </a:p>
-          <a:p>
-            <a:r>
-              <a:rPr lang="en-CA" dirty="0"/>
-              <a:t>Builder</a:t>
-            </a:r>
-          </a:p>
-          <a:p>
-            <a:r>
-              <a:rPr lang="en-CA" dirty="0"/>
-              <a:t>Decorator</a:t>
+              <a:t>mediator</a:t>
             </a:r>
           </a:p>
         </p:txBody>
@@ -3480,7 +3465,7 @@
           <a:p>
             <a:r>
               <a:rPr lang="en-CA" dirty="0"/>
-              <a:t>Factory pattern</a:t>
+              <a:t>Friend access (like private, etc.)</a:t>
             </a:r>
           </a:p>
         </p:txBody>
@@ -3508,31 +3493,25 @@
           <a:p>
             <a:r>
               <a:rPr lang="en-CA" dirty="0"/>
-              <a:t>“Creational pattern”</a:t>
+              <a:t>A “friend” class acts like the original class in that it can “see” all the private variables. </a:t>
             </a:r>
           </a:p>
           <a:p>
             <a:r>
               <a:rPr lang="en-CA" dirty="0"/>
-              <a:t>Assigns “responsibility” for creation (instantiation) to some specific object or class</a:t>
+              <a:t>You really want to avoid this. </a:t>
             </a:r>
           </a:p>
           <a:p>
             <a:r>
               <a:rPr lang="en-CA" dirty="0"/>
-              <a:t>This allows whoever is using it to be clueless/oblivious of the details of the object</a:t>
+              <a:t>Breaks encapsulation.</a:t>
             </a:r>
           </a:p>
           <a:p>
             <a:r>
               <a:rPr lang="en-CA" dirty="0"/>
-              <a:t>C++: It’s the thing that calls “new”</a:t>
-            </a:r>
-          </a:p>
-          <a:p>
-            <a:r>
-              <a:rPr lang="en-CA" dirty="0"/>
-              <a:t>Allows for us to add/change things without causing rebuilds.</a:t>
+              <a:t>Usually means somebody didn’t think things through…</a:t>
             </a:r>
           </a:p>
         </p:txBody>
@@ -3572,7 +3551,7 @@
           <p:cNvPr id="2" name="Title 1">
             <a:extLst>
               <a:ext uri="{FF2B5EF4-FFF2-40B4-BE49-F238E27FC236}">
-                <a16:creationId xmlns:a16="http://schemas.microsoft.com/office/drawing/2014/main" id="{4EF1F834-1374-891E-A644-596BA61A5BA6}"/>
+                <a16:creationId xmlns:a16="http://schemas.microsoft.com/office/drawing/2014/main" id="{54096B45-B2AB-138A-CA05-6401B27AACE9}"/>
               </a:ext>
             </a:extLst>
           </p:cNvPr>
@@ -3590,7 +3569,7 @@
           <a:p>
             <a:r>
               <a:rPr lang="en-CA" dirty="0"/>
-              <a:t>“Abstract” factory</a:t>
+              <a:t>Let’s have the robots attack each other</a:t>
             </a:r>
           </a:p>
         </p:txBody>
@@ -3600,7 +3579,7 @@
           <p:cNvPr id="3" name="Content Placeholder 2">
             <a:extLst>
               <a:ext uri="{FF2B5EF4-FFF2-40B4-BE49-F238E27FC236}">
-                <a16:creationId xmlns:a16="http://schemas.microsoft.com/office/drawing/2014/main" id="{4285F69C-D846-111D-EF5A-4DE88B5F6AC7}"/>
+                <a16:creationId xmlns:a16="http://schemas.microsoft.com/office/drawing/2014/main" id="{7AE0B63A-D859-459E-451B-DA832085FB49}"/>
               </a:ext>
             </a:extLst>
           </p:cNvPr>
@@ -3616,35 +3595,39 @@
           <a:bodyPr/>
           <a:lstStyle/>
           <a:p>
+            <a:pPr marL="0" indent="0">
+              <a:buNone/>
+            </a:pPr>
             <a:r>
               <a:rPr lang="en-CA" dirty="0"/>
-              <a:t>It’s a factory object</a:t>
+              <a:t>During update():</a:t>
             </a:r>
           </a:p>
           <a:p>
             <a:r>
               <a:rPr lang="en-CA" dirty="0"/>
-              <a:t>Returns an “abstract” class</a:t>
+              <a:t>Find another robot  :  SEARCHING_FOR_NEW_TARGET</a:t>
             </a:r>
           </a:p>
           <a:p>
             <a:r>
               <a:rPr lang="en-CA" dirty="0"/>
-              <a:t>C++: ideally, it’s a “pure virtual” class</a:t>
-            </a:r>
-          </a:p>
-          <a:p>
-            <a:pPr lvl="1"/>
+              <a:t>Move towards that robot: MOVING_TOWARD_TARGET</a:t>
+            </a:r>
+          </a:p>
+          <a:p>
             <a:r>
               <a:rPr lang="en-CA" dirty="0"/>
-              <a:t>All are virtual methods</a:t>
-            </a:r>
-          </a:p>
-          <a:p>
-            <a:pPr lvl="1"/>
+              <a:t>If they are within 25 meters, they attack: ATTACKING_TARGET</a:t>
+            </a:r>
+          </a:p>
+          <a:p>
+            <a:pPr marL="0" indent="0">
+              <a:buNone/>
+            </a:pPr>
             <a:r>
               <a:rPr lang="en-CA" dirty="0"/>
-              <a:t>All are “pure” i.e. “= 0”</a:t>
+              <a:t>If nothing else, they are DOING_NOTING_IDLE</a:t>
             </a:r>
           </a:p>
         </p:txBody>
@@ -3652,7 +3635,7 @@
     </p:spTree>
     <p:extLst>
       <p:ext uri="{BB962C8B-B14F-4D97-AF65-F5344CB8AC3E}">
-        <p14:creationId xmlns:p14="http://schemas.microsoft.com/office/powerpoint/2010/main" val="843365636"/>
+        <p14:creationId xmlns:p14="http://schemas.microsoft.com/office/powerpoint/2010/main" val="2154331782"/>
       </p:ext>
     </p:extLst>
   </p:cSld>
@@ -3684,7 +3667,7 @@
           <p:cNvPr id="2" name="Title 1">
             <a:extLst>
               <a:ext uri="{FF2B5EF4-FFF2-40B4-BE49-F238E27FC236}">
-                <a16:creationId xmlns:a16="http://schemas.microsoft.com/office/drawing/2014/main" id="{4EF1F834-1374-891E-A644-596BA61A5BA6}"/>
+                <a16:creationId xmlns:a16="http://schemas.microsoft.com/office/drawing/2014/main" id="{54096B45-B2AB-138A-CA05-6401B27AACE9}"/>
               </a:ext>
             </a:extLst>
           </p:cNvPr>
@@ -3702,7 +3685,7 @@
           <a:p>
             <a:r>
               <a:rPr lang="en-CA" dirty="0"/>
-              <a:t>“Abstract” factory: How to</a:t>
+              <a:t>Mediator</a:t>
             </a:r>
           </a:p>
         </p:txBody>
@@ -3712,7 +3695,7 @@
           <p:cNvPr id="3" name="Content Placeholder 2">
             <a:extLst>
               <a:ext uri="{FF2B5EF4-FFF2-40B4-BE49-F238E27FC236}">
-                <a16:creationId xmlns:a16="http://schemas.microsoft.com/office/drawing/2014/main" id="{4285F69C-D846-111D-EF5A-4DE88B5F6AC7}"/>
+                <a16:creationId xmlns:a16="http://schemas.microsoft.com/office/drawing/2014/main" id="{7AE0B63A-D859-459E-451B-DA832085FB49}"/>
               </a:ext>
             </a:extLst>
           </p:cNvPr>
@@ -3726,89 +3709,37 @@
         <p:spPr/>
         <p:txBody>
           <a:bodyPr>
-            <a:normAutofit fontScale="92500" lnSpcReduction="10000"/>
+            <a:normAutofit lnSpcReduction="10000"/>
           </a:bodyPr>
           <a:lstStyle/>
           <a:p>
-            <a:pPr marL="514350" indent="-514350">
-              <a:buFont typeface="+mj-lt"/>
-              <a:buAutoNum type="arabicPeriod"/>
-            </a:pPr>
             <a:r>
               <a:rPr lang="en-CA" dirty="0"/>
-              <a:t>Figure out the methods you want</a:t>
-            </a:r>
-          </a:p>
-          <a:p>
-            <a:pPr marL="514350" indent="-514350">
-              <a:buFont typeface="+mj-lt"/>
-              <a:buAutoNum type="arabicPeriod"/>
-            </a:pPr>
+              <a:t>You know about the “mediator interface” but NOT about the specifics of the objects that are being communicated to.</a:t>
+            </a:r>
+          </a:p>
+          <a:p>
             <a:r>
               <a:rPr lang="en-CA" dirty="0"/>
-              <a:t>Add them to an “interface” class (i.e. a regular class) but ALL the methods are pure virtual</a:t>
-            </a:r>
-          </a:p>
-          <a:p>
-            <a:pPr marL="514350" indent="-514350">
-              <a:buFont typeface="+mj-lt"/>
-              <a:buAutoNum type="arabicPeriod"/>
-            </a:pPr>
+              <a:t>This way you can add anything you want and ONLY the mediator “knows” about these new things.</a:t>
+            </a:r>
+          </a:p>
+          <a:p>
             <a:r>
               <a:rPr lang="en-CA" dirty="0"/>
-              <a:t>Add a virtual destructor</a:t>
-            </a:r>
-          </a:p>
-          <a:p>
-            <a:pPr marL="0" indent="0">
-              <a:buNone/>
-            </a:pPr>
+              <a:t>Interface takes “messages” that are in a format that everything knows about (like string + vec3s, or JSON, or XML, or SQL, or whatever)</a:t>
+            </a:r>
+          </a:p>
+          <a:p>
             <a:r>
               <a:rPr lang="en-CA" dirty="0"/>
-              <a:t>Factory:</a:t>
-            </a:r>
-          </a:p>
-          <a:p>
-            <a:pPr marL="514350" indent="-514350">
-              <a:buAutoNum type="arabicPeriod"/>
-            </a:pPr>
+              <a:t>Mediators can send messages back, too (where the objects have a “message” interface).</a:t>
+            </a:r>
+          </a:p>
+          <a:p>
             <a:r>
               <a:rPr lang="en-CA" dirty="0"/>
-              <a:t>Returns this virtual interface and takes a known type (int, string, something like that, but NEVER an </a:t>
-            </a:r>
-            <a:r>
-              <a:rPr lang="en-CA" dirty="0" err="1"/>
-              <a:t>enum</a:t>
-            </a:r>
-            <a:r>
-              <a:rPr lang="en-CA" dirty="0"/>
-              <a:t> or #define)</a:t>
-            </a:r>
-          </a:p>
-          <a:p>
-            <a:pPr marL="514350" indent="-514350">
-              <a:buAutoNum type="arabicPeriod"/>
-            </a:pPr>
-            <a:r>
-              <a:rPr lang="en-CA" dirty="0"/>
-              <a:t>In the header: ONLY include the interface class NEVER the actual classes</a:t>
-            </a:r>
-          </a:p>
-          <a:p>
-            <a:pPr marL="514350" indent="-514350">
-              <a:buAutoNum type="arabicPeriod"/>
-            </a:pPr>
-            <a:r>
-              <a:rPr lang="en-CA" dirty="0"/>
-              <a:t>In the “body” (“implementation”/</a:t>
-            </a:r>
-            <a:r>
-              <a:rPr lang="en-CA" dirty="0" err="1"/>
-              <a:t>cpp</a:t>
-            </a:r>
-            <a:r>
-              <a:rPr lang="en-CA" dirty="0"/>
-              <a:t>) file, include the specific classes (the “derived” classes)</a:t>
+              <a:t>Mediator can be “heavy” (or smart, lots of code) or “light” (or dumb, very little code)</a:t>
             </a:r>
           </a:p>
         </p:txBody>
@@ -3816,476 +3747,7 @@
     </p:spTree>
     <p:extLst>
       <p:ext uri="{BB962C8B-B14F-4D97-AF65-F5344CB8AC3E}">
-        <p14:creationId xmlns:p14="http://schemas.microsoft.com/office/powerpoint/2010/main" val="1758110361"/>
-      </p:ext>
-    </p:extLst>
-  </p:cSld>
-  <p:clrMapOvr>
-    <a:masterClrMapping/>
-  </p:clrMapOvr>
-</p:sld>
-</file>
-
-<file path=ppt/slides/slide5.xml><?xml version="1.0" encoding="utf-8"?>
-<p:sld xmlns:a="http://schemas.openxmlformats.org/drawingml/2006/main" xmlns:r="http://schemas.openxmlformats.org/officeDocument/2006/relationships" xmlns:p="http://schemas.openxmlformats.org/presentationml/2006/main">
-  <p:cSld>
-    <p:spTree>
-      <p:nvGrpSpPr>
-        <p:cNvPr id="1" name=""/>
-        <p:cNvGrpSpPr/>
-        <p:nvPr/>
-      </p:nvGrpSpPr>
-      <p:grpSpPr>
-        <a:xfrm>
-          <a:off x="0" y="0"/>
-          <a:ext cx="0" cy="0"/>
-          <a:chOff x="0" y="0"/>
-          <a:chExt cx="0" cy="0"/>
-        </a:xfrm>
-      </p:grpSpPr>
-      <p:sp>
-        <p:nvSpPr>
-          <p:cNvPr id="2" name="Title 1">
-            <a:extLst>
-              <a:ext uri="{FF2B5EF4-FFF2-40B4-BE49-F238E27FC236}">
-                <a16:creationId xmlns:a16="http://schemas.microsoft.com/office/drawing/2014/main" id="{4EF1F834-1374-891E-A644-596BA61A5BA6}"/>
-              </a:ext>
-            </a:extLst>
-          </p:cNvPr>
-          <p:cNvSpPr>
-            <a:spLocks noGrp="1"/>
-          </p:cNvSpPr>
-          <p:nvPr>
-            <p:ph type="title"/>
-          </p:nvPr>
-        </p:nvSpPr>
-        <p:spPr/>
-        <p:txBody>
-          <a:bodyPr/>
-          <a:lstStyle/>
-          <a:p>
-            <a:r>
-              <a:rPr lang="en-CA" dirty="0"/>
-              <a:t>“Abstract” factory: How to</a:t>
-            </a:r>
-          </a:p>
-        </p:txBody>
-      </p:sp>
-      <p:sp>
-        <p:nvSpPr>
-          <p:cNvPr id="3" name="Content Placeholder 2">
-            <a:extLst>
-              <a:ext uri="{FF2B5EF4-FFF2-40B4-BE49-F238E27FC236}">
-                <a16:creationId xmlns:a16="http://schemas.microsoft.com/office/drawing/2014/main" id="{4285F69C-D846-111D-EF5A-4DE88B5F6AC7}"/>
-              </a:ext>
-            </a:extLst>
-          </p:cNvPr>
-          <p:cNvSpPr>
-            <a:spLocks noGrp="1"/>
-          </p:cNvSpPr>
-          <p:nvPr>
-            <p:ph idx="1"/>
-          </p:nvPr>
-        </p:nvSpPr>
-        <p:spPr/>
-        <p:txBody>
-          <a:bodyPr>
-            <a:normAutofit/>
-          </a:bodyPr>
-          <a:lstStyle/>
-          <a:p>
-            <a:r>
-              <a:rPr lang="en-CA" dirty="0"/>
-              <a:t>This is used when all the object we are creating “boil down” to the exact same “type” of thing. </a:t>
-            </a:r>
-          </a:p>
-          <a:p>
-            <a:r>
-              <a:rPr lang="en-CA" dirty="0"/>
-              <a:t>i.e. they can all have the identical interface.</a:t>
-            </a:r>
-          </a:p>
-          <a:p>
-            <a:r>
-              <a:rPr lang="en-CA" dirty="0" err="1"/>
-              <a:t>Eg</a:t>
-            </a:r>
-            <a:r>
-              <a:rPr lang="en-CA" dirty="0"/>
-              <a:t>: Account, </a:t>
-            </a:r>
-            <a:r>
-              <a:rPr lang="en-CA" dirty="0" err="1"/>
-              <a:t>SavingAccount</a:t>
-            </a:r>
-            <a:r>
-              <a:rPr lang="en-CA" dirty="0"/>
-              <a:t>, </a:t>
-            </a:r>
-            <a:r>
-              <a:rPr lang="en-CA" dirty="0" err="1"/>
-              <a:t>ChequingAccount</a:t>
-            </a:r>
-            <a:r>
-              <a:rPr lang="en-CA" dirty="0"/>
-              <a:t>…</a:t>
-            </a:r>
-          </a:p>
-        </p:txBody>
-      </p:sp>
-    </p:spTree>
-    <p:extLst>
-      <p:ext uri="{BB962C8B-B14F-4D97-AF65-F5344CB8AC3E}">
-        <p14:creationId xmlns:p14="http://schemas.microsoft.com/office/powerpoint/2010/main" val="2999679213"/>
-      </p:ext>
-    </p:extLst>
-  </p:cSld>
-  <p:clrMapOvr>
-    <a:masterClrMapping/>
-  </p:clrMapOvr>
-</p:sld>
-</file>
-
-<file path=ppt/slides/slide6.xml><?xml version="1.0" encoding="utf-8"?>
-<p:sld xmlns:a="http://schemas.openxmlformats.org/drawingml/2006/main" xmlns:r="http://schemas.openxmlformats.org/officeDocument/2006/relationships" xmlns:p="http://schemas.openxmlformats.org/presentationml/2006/main">
-  <p:cSld>
-    <p:spTree>
-      <p:nvGrpSpPr>
-        <p:cNvPr id="1" name=""/>
-        <p:cNvGrpSpPr/>
-        <p:nvPr/>
-      </p:nvGrpSpPr>
-      <p:grpSpPr>
-        <a:xfrm>
-          <a:off x="0" y="0"/>
-          <a:ext cx="0" cy="0"/>
-          <a:chOff x="0" y="0"/>
-          <a:chExt cx="0" cy="0"/>
-        </a:xfrm>
-      </p:grpSpPr>
-      <p:sp>
-        <p:nvSpPr>
-          <p:cNvPr id="2" name="Title 1">
-            <a:extLst>
-              <a:ext uri="{FF2B5EF4-FFF2-40B4-BE49-F238E27FC236}">
-                <a16:creationId xmlns:a16="http://schemas.microsoft.com/office/drawing/2014/main" id="{4EF1F834-1374-891E-A644-596BA61A5BA6}"/>
-              </a:ext>
-            </a:extLst>
-          </p:cNvPr>
-          <p:cNvSpPr>
-            <a:spLocks noGrp="1"/>
-          </p:cNvSpPr>
-          <p:nvPr>
-            <p:ph type="title"/>
-          </p:nvPr>
-        </p:nvSpPr>
-        <p:spPr/>
-        <p:txBody>
-          <a:bodyPr/>
-          <a:lstStyle/>
-          <a:p>
-            <a:r>
-              <a:rPr lang="en-CA" dirty="0"/>
-              <a:t>Singleton</a:t>
-            </a:r>
-          </a:p>
-        </p:txBody>
-      </p:sp>
-      <p:sp>
-        <p:nvSpPr>
-          <p:cNvPr id="3" name="Content Placeholder 2">
-            <a:extLst>
-              <a:ext uri="{FF2B5EF4-FFF2-40B4-BE49-F238E27FC236}">
-                <a16:creationId xmlns:a16="http://schemas.microsoft.com/office/drawing/2014/main" id="{4285F69C-D846-111D-EF5A-4DE88B5F6AC7}"/>
-              </a:ext>
-            </a:extLst>
-          </p:cNvPr>
-          <p:cNvSpPr>
-            <a:spLocks noGrp="1"/>
-          </p:cNvSpPr>
-          <p:nvPr>
-            <p:ph idx="1"/>
-          </p:nvPr>
-        </p:nvSpPr>
-        <p:spPr/>
-        <p:txBody>
-          <a:bodyPr>
-            <a:normAutofit fontScale="92500" lnSpcReduction="20000"/>
-          </a:bodyPr>
-          <a:lstStyle/>
-          <a:p>
-            <a:r>
-              <a:rPr lang="en-CA" dirty="0"/>
-              <a:t>Sort of like a factory in that the object is the only one that can create itself</a:t>
-            </a:r>
-          </a:p>
-          <a:p>
-            <a:r>
-              <a:rPr lang="en-CA" dirty="0"/>
-              <a:t>C++:</a:t>
-            </a:r>
-          </a:p>
-          <a:p>
-            <a:pPr lvl="1"/>
-            <a:r>
-              <a:rPr lang="en-CA" dirty="0"/>
-              <a:t>Make new private</a:t>
-            </a:r>
-          </a:p>
-          <a:p>
-            <a:pPr lvl="1"/>
-            <a:r>
-              <a:rPr lang="en-CA" dirty="0"/>
-              <a:t>Make a static point to a type of itself (</a:t>
-            </a:r>
-            <a:r>
-              <a:rPr lang="en-CA" dirty="0" err="1"/>
-              <a:t>cArena</a:t>
-            </a:r>
-            <a:r>
-              <a:rPr lang="en-CA" dirty="0"/>
-              <a:t>*) and set it to a known value, likely NULL (or 0 or </a:t>
-            </a:r>
-            <a:r>
-              <a:rPr lang="en-CA" dirty="0" err="1"/>
-              <a:t>nullptr</a:t>
-            </a:r>
-            <a:r>
-              <a:rPr lang="en-CA" dirty="0"/>
-              <a:t>)</a:t>
-            </a:r>
-          </a:p>
-          <a:p>
-            <a:pPr lvl="2"/>
-            <a:r>
-              <a:rPr lang="en-CA" dirty="0"/>
-              <a:t>Note the strange static initialization needed for C++ where the variable CAN’T be assigned in the header, but only in the CPP file</a:t>
-            </a:r>
-          </a:p>
-          <a:p>
-            <a:pPr lvl="1"/>
-            <a:r>
-              <a:rPr lang="en-CA" dirty="0"/>
-              <a:t>Make a static method (i.e. put “static” in front of the method) and check if the pointer has been assigned to anything, if not create itself (call new) and return the pointer.</a:t>
-            </a:r>
-          </a:p>
-          <a:p>
-            <a:r>
-              <a:rPr lang="en-CA" dirty="0"/>
-              <a:t>Anything wanting this calls the “factory method” which is static:</a:t>
-            </a:r>
-          </a:p>
-          <a:p>
-            <a:pPr lvl="1"/>
-            <a:r>
-              <a:rPr lang="en-CA" dirty="0" err="1"/>
-              <a:t>cArena</a:t>
-            </a:r>
-            <a:r>
-              <a:rPr lang="en-CA" dirty="0"/>
-              <a:t>* </a:t>
-            </a:r>
-            <a:r>
-              <a:rPr lang="en-CA" dirty="0" err="1"/>
-              <a:t>pMyArena</a:t>
-            </a:r>
-            <a:r>
-              <a:rPr lang="en-CA" dirty="0"/>
-              <a:t> = </a:t>
-            </a:r>
-            <a:r>
-              <a:rPr lang="en-CA" b="1" u="sng" dirty="0" err="1"/>
-              <a:t>cArena</a:t>
-            </a:r>
-            <a:r>
-              <a:rPr lang="en-CA" b="1" u="sng" dirty="0"/>
-              <a:t>::</a:t>
-            </a:r>
-            <a:r>
-              <a:rPr lang="en-CA" dirty="0" err="1"/>
-              <a:t>getMeAnArenaPlease</a:t>
-            </a:r>
-            <a:r>
-              <a:rPr lang="en-CA" dirty="0"/>
-              <a:t>();</a:t>
-            </a:r>
-          </a:p>
-          <a:p>
-            <a:r>
-              <a:rPr lang="en-CA" dirty="0"/>
-              <a:t>Issue: Who destroys this? </a:t>
-            </a:r>
-          </a:p>
-        </p:txBody>
-      </p:sp>
-    </p:spTree>
-    <p:extLst>
-      <p:ext uri="{BB962C8B-B14F-4D97-AF65-F5344CB8AC3E}">
-        <p14:creationId xmlns:p14="http://schemas.microsoft.com/office/powerpoint/2010/main" val="3803234295"/>
-      </p:ext>
-    </p:extLst>
-  </p:cSld>
-  <p:clrMapOvr>
-    <a:masterClrMapping/>
-  </p:clrMapOvr>
-</p:sld>
-</file>
-
-<file path=ppt/slides/slide7.xml><?xml version="1.0" encoding="utf-8"?>
-<p:sld xmlns:a="http://schemas.openxmlformats.org/drawingml/2006/main" xmlns:r="http://schemas.openxmlformats.org/officeDocument/2006/relationships" xmlns:p="http://schemas.openxmlformats.org/presentationml/2006/main">
-  <p:cSld>
-    <p:spTree>
-      <p:nvGrpSpPr>
-        <p:cNvPr id="1" name=""/>
-        <p:cNvGrpSpPr/>
-        <p:nvPr/>
-      </p:nvGrpSpPr>
-      <p:grpSpPr>
-        <a:xfrm>
-          <a:off x="0" y="0"/>
-          <a:ext cx="0" cy="0"/>
-          <a:chOff x="0" y="0"/>
-          <a:chExt cx="0" cy="0"/>
-        </a:xfrm>
-      </p:grpSpPr>
-      <p:sp>
-        <p:nvSpPr>
-          <p:cNvPr id="2" name="Title 1">
-            <a:extLst>
-              <a:ext uri="{FF2B5EF4-FFF2-40B4-BE49-F238E27FC236}">
-                <a16:creationId xmlns:a16="http://schemas.microsoft.com/office/drawing/2014/main" id="{4EF1F834-1374-891E-A644-596BA61A5BA6}"/>
-              </a:ext>
-            </a:extLst>
-          </p:cNvPr>
-          <p:cNvSpPr>
-            <a:spLocks noGrp="1"/>
-          </p:cNvSpPr>
-          <p:nvPr>
-            <p:ph type="title"/>
-          </p:nvPr>
-        </p:nvSpPr>
-        <p:spPr/>
-        <p:txBody>
-          <a:bodyPr/>
-          <a:lstStyle/>
-          <a:p>
-            <a:r>
-              <a:rPr lang="en-CA" dirty="0"/>
-              <a:t>“Builder” pattern</a:t>
-            </a:r>
-          </a:p>
-        </p:txBody>
-      </p:sp>
-      <p:sp>
-        <p:nvSpPr>
-          <p:cNvPr id="3" name="Content Placeholder 2">
-            <a:extLst>
-              <a:ext uri="{FF2B5EF4-FFF2-40B4-BE49-F238E27FC236}">
-                <a16:creationId xmlns:a16="http://schemas.microsoft.com/office/drawing/2014/main" id="{4285F69C-D846-111D-EF5A-4DE88B5F6AC7}"/>
-              </a:ext>
-            </a:extLst>
-          </p:cNvPr>
-          <p:cNvSpPr>
-            <a:spLocks noGrp="1"/>
-          </p:cNvSpPr>
-          <p:nvPr>
-            <p:ph idx="1"/>
-          </p:nvPr>
-        </p:nvSpPr>
-        <p:spPr/>
-        <p:txBody>
-          <a:bodyPr>
-            <a:normAutofit/>
-          </a:bodyPr>
-          <a:lstStyle/>
-          <a:p>
-            <a:r>
-              <a:rPr lang="en-CA" dirty="0"/>
-              <a:t>Another factory pattern, but NOT necessarily an abstract one.</a:t>
-            </a:r>
-          </a:p>
-          <a:p>
-            <a:r>
-              <a:rPr lang="en-CA" dirty="0"/>
-              <a:t>Usually it returns a variation of objects that can have the same base interface BUT:</a:t>
-            </a:r>
-          </a:p>
-          <a:p>
-            <a:pPr lvl="1"/>
-            <a:r>
-              <a:rPr lang="en-CA" dirty="0"/>
-              <a:t>Additional things are “built” onto it.</a:t>
-            </a:r>
-          </a:p>
-          <a:p>
-            <a:pPr lvl="1"/>
-            <a:r>
-              <a:rPr lang="en-CA" dirty="0"/>
-              <a:t>Robot </a:t>
-            </a:r>
-            <a:r>
-              <a:rPr lang="en-CA" dirty="0">
-                <a:sym typeface="Wingdings" panose="05000000000000000000" pitchFamily="2" charset="2"/>
-              </a:rPr>
-              <a:t> iRobot class with a “regular” Weapon of </a:t>
-            </a:r>
-            <a:r>
-              <a:rPr lang="en-CA" dirty="0" err="1">
-                <a:sym typeface="Wingdings" panose="05000000000000000000" pitchFamily="2" charset="2"/>
-              </a:rPr>
-              <a:t>iWepon</a:t>
-            </a:r>
-            <a:r>
-              <a:rPr lang="en-CA" dirty="0">
-                <a:sym typeface="Wingdings" panose="05000000000000000000" pitchFamily="2" charset="2"/>
-              </a:rPr>
-              <a:t> interface</a:t>
-            </a:r>
-          </a:p>
-          <a:p>
-            <a:pPr lvl="1"/>
-            <a:r>
-              <a:rPr lang="en-CA" dirty="0" err="1">
-                <a:sym typeface="Wingdings" panose="05000000000000000000" pitchFamily="2" charset="2"/>
-              </a:rPr>
-              <a:t>SuperRobot</a:t>
-            </a:r>
-            <a:r>
-              <a:rPr lang="en-CA" dirty="0">
-                <a:sym typeface="Wingdings" panose="05000000000000000000" pitchFamily="2" charset="2"/>
-              </a:rPr>
-              <a:t>  iRobot class with a 2 weapons but also a sword</a:t>
-            </a:r>
-          </a:p>
-          <a:p>
-            <a:pPr lvl="2"/>
-            <a:r>
-              <a:rPr lang="en-CA" dirty="0">
-                <a:sym typeface="Wingdings" panose="05000000000000000000" pitchFamily="2" charset="2"/>
-              </a:rPr>
-              <a:t>The sword is completely different </a:t>
-            </a:r>
-          </a:p>
-          <a:p>
-            <a:r>
-              <a:rPr lang="en-CA" dirty="0">
-                <a:sym typeface="Wingdings" panose="05000000000000000000" pitchFamily="2" charset="2"/>
-              </a:rPr>
-              <a:t>Both types of robots have the weapon usage “hidden” behind the interface with the “attack</a:t>
-            </a:r>
-            <a:r>
-              <a:rPr lang="en-CA">
-                <a:sym typeface="Wingdings" panose="05000000000000000000" pitchFamily="2" charset="2"/>
-              </a:rPr>
-              <a:t>()” method</a:t>
-            </a:r>
-          </a:p>
-        </p:txBody>
-      </p:sp>
-    </p:spTree>
-    <p:extLst>
-      <p:ext uri="{BB962C8B-B14F-4D97-AF65-F5344CB8AC3E}">
-        <p14:creationId xmlns:p14="http://schemas.microsoft.com/office/powerpoint/2010/main" val="3819701409"/>
+        <p14:creationId xmlns:p14="http://schemas.microsoft.com/office/powerpoint/2010/main" val="1378725689"/>
       </p:ext>
     </p:extLst>
   </p:cSld>

</xml_diff>